<commit_message>
improvements based on office hours feedback of both classes
</commit_message>
<xml_diff>
--- a/SEDS_content/03.Version_Control_p1.pptx
+++ b/SEDS_content/03.Version_Control_p1.pptx
@@ -5,36 +5,37 @@
     <p:sldMasterId id="2147483648" r:id="rId1"/>
   </p:sldMasterIdLst>
   <p:notesMasterIdLst>
-    <p:notesMasterId r:id="rId29"/>
+    <p:notesMasterId r:id="rId30"/>
   </p:notesMasterIdLst>
   <p:sldIdLst>
     <p:sldId id="256" r:id="rId2"/>
     <p:sldId id="281" r:id="rId3"/>
-    <p:sldId id="295" r:id="rId4"/>
-    <p:sldId id="282" r:id="rId5"/>
-    <p:sldId id="283" r:id="rId6"/>
-    <p:sldId id="284" r:id="rId7"/>
-    <p:sldId id="285" r:id="rId8"/>
-    <p:sldId id="287" r:id="rId9"/>
-    <p:sldId id="288" r:id="rId10"/>
-    <p:sldId id="289" r:id="rId11"/>
-    <p:sldId id="290" r:id="rId12"/>
-    <p:sldId id="291" r:id="rId13"/>
-    <p:sldId id="292" r:id="rId14"/>
-    <p:sldId id="293" r:id="rId15"/>
-    <p:sldId id="269" r:id="rId16"/>
-    <p:sldId id="270" r:id="rId17"/>
-    <p:sldId id="271" r:id="rId18"/>
-    <p:sldId id="272" r:id="rId19"/>
-    <p:sldId id="273" r:id="rId20"/>
-    <p:sldId id="274" r:id="rId21"/>
-    <p:sldId id="275" r:id="rId22"/>
-    <p:sldId id="276" r:id="rId23"/>
-    <p:sldId id="277" r:id="rId24"/>
-    <p:sldId id="278" r:id="rId25"/>
-    <p:sldId id="279" r:id="rId26"/>
-    <p:sldId id="280" r:id="rId27"/>
-    <p:sldId id="294" r:id="rId28"/>
+    <p:sldId id="296" r:id="rId4"/>
+    <p:sldId id="295" r:id="rId5"/>
+    <p:sldId id="282" r:id="rId6"/>
+    <p:sldId id="283" r:id="rId7"/>
+    <p:sldId id="284" r:id="rId8"/>
+    <p:sldId id="285" r:id="rId9"/>
+    <p:sldId id="287" r:id="rId10"/>
+    <p:sldId id="288" r:id="rId11"/>
+    <p:sldId id="289" r:id="rId12"/>
+    <p:sldId id="290" r:id="rId13"/>
+    <p:sldId id="291" r:id="rId14"/>
+    <p:sldId id="292" r:id="rId15"/>
+    <p:sldId id="293" r:id="rId16"/>
+    <p:sldId id="269" r:id="rId17"/>
+    <p:sldId id="270" r:id="rId18"/>
+    <p:sldId id="271" r:id="rId19"/>
+    <p:sldId id="272" r:id="rId20"/>
+    <p:sldId id="273" r:id="rId21"/>
+    <p:sldId id="274" r:id="rId22"/>
+    <p:sldId id="275" r:id="rId23"/>
+    <p:sldId id="276" r:id="rId24"/>
+    <p:sldId id="277" r:id="rId25"/>
+    <p:sldId id="278" r:id="rId26"/>
+    <p:sldId id="279" r:id="rId27"/>
+    <p:sldId id="280" r:id="rId28"/>
+    <p:sldId id="294" r:id="rId29"/>
   </p:sldIdLst>
   <p:sldSz cx="9144000" cy="6858000" type="screen4x3"/>
   <p:notesSz cx="6858000" cy="9144000"/>
@@ -651,7 +652,7 @@
               <a:pPr>
                 <a:defRPr/>
               </a:pPr>
-              <a:t>23</a:t>
+              <a:t>24</a:t>
             </a:fld>
             <a:endParaRPr lang="en-US"/>
           </a:p>
@@ -795,7 +796,7 @@
               <a:pPr>
                 <a:defRPr/>
               </a:pPr>
-              <a:t>24</a:t>
+              <a:t>25</a:t>
             </a:fld>
             <a:endParaRPr lang="en-US"/>
           </a:p>
@@ -939,7 +940,7 @@
               <a:pPr>
                 <a:defRPr/>
               </a:pPr>
-              <a:t>25</a:t>
+              <a:t>26</a:t>
             </a:fld>
             <a:endParaRPr lang="en-US"/>
           </a:p>
@@ -1083,7 +1084,7 @@
               <a:pPr>
                 <a:defRPr/>
               </a:pPr>
-              <a:t>26</a:t>
+              <a:t>27</a:t>
             </a:fld>
             <a:endParaRPr lang="en-US"/>
           </a:p>
@@ -1227,7 +1228,7 @@
               <a:pPr>
                 <a:defRPr/>
               </a:pPr>
-              <a:t>15</a:t>
+              <a:t>16</a:t>
             </a:fld>
             <a:endParaRPr lang="en-US"/>
           </a:p>
@@ -1371,7 +1372,7 @@
               <a:pPr>
                 <a:defRPr/>
               </a:pPr>
-              <a:t>16</a:t>
+              <a:t>17</a:t>
             </a:fld>
             <a:endParaRPr lang="en-US"/>
           </a:p>
@@ -1515,7 +1516,7 @@
               <a:pPr>
                 <a:defRPr/>
               </a:pPr>
-              <a:t>17</a:t>
+              <a:t>18</a:t>
             </a:fld>
             <a:endParaRPr lang="en-US"/>
           </a:p>
@@ -1659,7 +1660,7 @@
               <a:pPr>
                 <a:defRPr/>
               </a:pPr>
-              <a:t>18</a:t>
+              <a:t>19</a:t>
             </a:fld>
             <a:endParaRPr lang="en-US"/>
           </a:p>
@@ -1803,7 +1804,7 @@
               <a:pPr>
                 <a:defRPr/>
               </a:pPr>
-              <a:t>19</a:t>
+              <a:t>20</a:t>
             </a:fld>
             <a:endParaRPr lang="en-US"/>
           </a:p>
@@ -1947,7 +1948,7 @@
               <a:pPr>
                 <a:defRPr/>
               </a:pPr>
-              <a:t>20</a:t>
+              <a:t>21</a:t>
             </a:fld>
             <a:endParaRPr lang="en-US"/>
           </a:p>
@@ -2091,7 +2092,7 @@
               <a:pPr>
                 <a:defRPr/>
               </a:pPr>
-              <a:t>21</a:t>
+              <a:t>22</a:t>
             </a:fld>
             <a:endParaRPr lang="en-US"/>
           </a:p>
@@ -2235,7 +2236,7 @@
               <a:pPr>
                 <a:defRPr/>
               </a:pPr>
-              <a:t>22</a:t>
+              <a:t>23</a:t>
             </a:fld>
             <a:endParaRPr lang="en-US"/>
           </a:p>
@@ -6127,38 +6128,91 @@
           <a:bodyPr/>
           <a:lstStyle/>
           <a:p>
-            <a:endParaRPr lang="en-US"/>
-          </a:p>
-        </p:txBody>
-      </p:sp>
-      <p:pic>
-        <p:nvPicPr>
-          <p:cNvPr id="4" name="Picture 3"/>
-          <p:cNvPicPr>
-            <a:picLocks noChangeAspect="1"/>
-          </p:cNvPicPr>
-          <p:nvPr/>
-        </p:nvPicPr>
-        <p:blipFill>
-          <a:blip r:embed="rId2"/>
-          <a:stretch>
-            <a:fillRect/>
-          </a:stretch>
-        </p:blipFill>
-        <p:spPr>
-          <a:xfrm>
-            <a:off x="2254250" y="1747536"/>
-            <a:ext cx="4635500" cy="4762500"/>
-          </a:xfrm>
-          <a:prstGeom prst="rect">
-            <a:avLst/>
-          </a:prstGeom>
-        </p:spPr>
-      </p:pic>
+            <a:pPr>
+              <a:spcBef>
+                <a:spcPts val="800"/>
+              </a:spcBef>
+              <a:buFont typeface="Arial" charset="0"/>
+              <a:buChar char="•"/>
+              <a:defRPr/>
+            </a:pPr>
+            <a:r>
+              <a:rPr lang="en-US" dirty="0">
+                <a:latin typeface="Calibri" charset="0"/>
+              </a:rPr>
+              <a:t>You are developing software with other people</a:t>
+            </a:r>
+          </a:p>
+          <a:p>
+            <a:pPr lvl="1">
+              <a:spcBef>
+                <a:spcPts val="800"/>
+              </a:spcBef>
+              <a:buFont typeface="Arial" charset="0"/>
+              <a:buChar char="•"/>
+              <a:defRPr/>
+            </a:pPr>
+            <a:r>
+              <a:rPr lang="en-US" sz="3200" dirty="0">
+                <a:latin typeface="Calibri" charset="0"/>
+              </a:rPr>
+              <a:t>You want to be able to identify and resolve conflicts during code development</a:t>
+            </a:r>
+          </a:p>
+          <a:p>
+            <a:pPr lvl="2">
+              <a:spcBef>
+                <a:spcPts val="800"/>
+              </a:spcBef>
+              <a:buFont typeface="Arial" charset="0"/>
+              <a:buChar char="•"/>
+              <a:defRPr/>
+            </a:pPr>
+            <a:r>
+              <a:rPr lang="en-US" sz="3200" dirty="0">
+                <a:latin typeface="Calibri" charset="0"/>
+              </a:rPr>
+              <a:t>Two people working on the same function at the same time</a:t>
+            </a:r>
+          </a:p>
+          <a:p>
+            <a:pPr lvl="1">
+              <a:spcBef>
+                <a:spcPts val="800"/>
+              </a:spcBef>
+              <a:buFont typeface="Arial" charset="0"/>
+              <a:buChar char="•"/>
+              <a:defRPr/>
+            </a:pPr>
+            <a:r>
+              <a:rPr lang="en-US" sz="3200" dirty="0">
+                <a:latin typeface="Calibri" charset="0"/>
+              </a:rPr>
+              <a:t>You need to be able to identify who is responsible for what pieces of code</a:t>
+            </a:r>
+          </a:p>
+          <a:p>
+            <a:pPr lvl="2">
+              <a:spcBef>
+                <a:spcPts val="800"/>
+              </a:spcBef>
+              <a:buFont typeface="Arial" charset="0"/>
+              <a:buChar char="•"/>
+              <a:defRPr/>
+            </a:pPr>
+            <a:endParaRPr lang="en-US" sz="3200" dirty="0">
+              <a:latin typeface="Calibri" charset="0"/>
+            </a:endParaRPr>
+          </a:p>
+          <a:p>
+            <a:endParaRPr lang="en-US" dirty="0"/>
+          </a:p>
+        </p:txBody>
+      </p:sp>
     </p:spTree>
     <p:extLst>
       <p:ext uri="{BB962C8B-B14F-4D97-AF65-F5344CB8AC3E}">
-        <p14:creationId xmlns:p14="http://schemas.microsoft.com/office/powerpoint/2010/main" val="261644260"/>
+        <p14:creationId xmlns:p14="http://schemas.microsoft.com/office/powerpoint/2010/main" val="99088052"/>
       </p:ext>
     </p:extLst>
   </p:cSld>
@@ -6243,94 +6297,18 @@
         </p:blipFill>
         <p:spPr>
           <a:xfrm>
-            <a:off x="2133600" y="1717072"/>
-            <a:ext cx="4876800" cy="4940300"/>
+            <a:off x="2254250" y="1747536"/>
+            <a:ext cx="4635500" cy="4762500"/>
           </a:xfrm>
           <a:prstGeom prst="rect">
             <a:avLst/>
           </a:prstGeom>
         </p:spPr>
       </p:pic>
-      <p:sp>
-        <p:nvSpPr>
-          <p:cNvPr id="5" name="TextBox 4"/>
-          <p:cNvSpPr txBox="1"/>
-          <p:nvPr/>
-        </p:nvSpPr>
-        <p:spPr>
-          <a:xfrm>
-            <a:off x="1219200" y="2364772"/>
-            <a:ext cx="868597" cy="461665"/>
-          </a:xfrm>
-          <a:prstGeom prst="rect">
-            <a:avLst/>
-          </a:prstGeom>
-          <a:noFill/>
-        </p:spPr>
-        <p:txBody>
-          <a:bodyPr wrap="none" rtlCol="0">
-            <a:spAutoFit/>
-          </a:bodyPr>
-          <a:lstStyle/>
-          <a:p>
-            <a:r>
-              <a:rPr lang="en-US" dirty="0" smtClean="0">
-                <a:solidFill>
-                  <a:schemeClr val="tx1"/>
-                </a:solidFill>
-              </a:rPr>
-              <a:t>Mary</a:t>
-            </a:r>
-            <a:endParaRPr lang="en-US" dirty="0">
-              <a:solidFill>
-                <a:schemeClr val="tx1"/>
-              </a:solidFill>
-            </a:endParaRPr>
-          </a:p>
-        </p:txBody>
-      </p:sp>
-      <p:sp>
-        <p:nvSpPr>
-          <p:cNvPr id="6" name="TextBox 5"/>
-          <p:cNvSpPr txBox="1"/>
-          <p:nvPr/>
-        </p:nvSpPr>
-        <p:spPr>
-          <a:xfrm>
-            <a:off x="1219200" y="4650772"/>
-            <a:ext cx="864590" cy="461665"/>
-          </a:xfrm>
-          <a:prstGeom prst="rect">
-            <a:avLst/>
-          </a:prstGeom>
-          <a:noFill/>
-        </p:spPr>
-        <p:txBody>
-          <a:bodyPr wrap="none" rtlCol="0">
-            <a:spAutoFit/>
-          </a:bodyPr>
-          <a:lstStyle/>
-          <a:p>
-            <a:r>
-              <a:rPr lang="en-US" dirty="0" smtClean="0">
-                <a:solidFill>
-                  <a:schemeClr val="tx1"/>
-                </a:solidFill>
-              </a:rPr>
-              <a:t>Alice</a:t>
-            </a:r>
-            <a:endParaRPr lang="en-US" dirty="0">
-              <a:solidFill>
-                <a:schemeClr val="tx1"/>
-              </a:solidFill>
-            </a:endParaRPr>
-          </a:p>
-        </p:txBody>
-      </p:sp>
     </p:spTree>
     <p:extLst>
       <p:ext uri="{BB962C8B-B14F-4D97-AF65-F5344CB8AC3E}">
-        <p14:creationId xmlns:p14="http://schemas.microsoft.com/office/powerpoint/2010/main" val="594885862"/>
+        <p14:creationId xmlns:p14="http://schemas.microsoft.com/office/powerpoint/2010/main" val="261644260"/>
       </p:ext>
     </p:extLst>
   </p:cSld>
@@ -6374,7 +6352,7 @@
           <a:p>
             <a:r>
               <a:rPr lang="en-US" dirty="0" smtClean="0"/>
-              <a:t>Why else?</a:t>
+              <a:t>Why do I need version control?</a:t>
             </a:r>
             <a:endParaRPr lang="en-US" dirty="0"/>
           </a:p>
@@ -6395,46 +6373,114 @@
           <a:bodyPr/>
           <a:lstStyle/>
           <a:p>
-            <a:pPr>
-              <a:spcBef>
-                <a:spcPts val="800"/>
-              </a:spcBef>
-              <a:buFont typeface="Arial" charset="0"/>
-              <a:buChar char="•"/>
-              <a:defRPr/>
-            </a:pPr>
-            <a:r>
-              <a:rPr lang="en-US" dirty="0">
-                <a:latin typeface="Calibri" charset="0"/>
+            <a:endParaRPr lang="en-US"/>
+          </a:p>
+        </p:txBody>
+      </p:sp>
+      <p:pic>
+        <p:nvPicPr>
+          <p:cNvPr id="4" name="Picture 3"/>
+          <p:cNvPicPr>
+            <a:picLocks noChangeAspect="1"/>
+          </p:cNvPicPr>
+          <p:nvPr/>
+        </p:nvPicPr>
+        <p:blipFill>
+          <a:blip r:embed="rId2"/>
+          <a:stretch>
+            <a:fillRect/>
+          </a:stretch>
+        </p:blipFill>
+        <p:spPr>
+          <a:xfrm>
+            <a:off x="2133600" y="1717072"/>
+            <a:ext cx="4876800" cy="4940300"/>
+          </a:xfrm>
+          <a:prstGeom prst="rect">
+            <a:avLst/>
+          </a:prstGeom>
+        </p:spPr>
+      </p:pic>
+      <p:sp>
+        <p:nvSpPr>
+          <p:cNvPr id="5" name="TextBox 4"/>
+          <p:cNvSpPr txBox="1"/>
+          <p:nvPr/>
+        </p:nvSpPr>
+        <p:spPr>
+          <a:xfrm>
+            <a:off x="1219200" y="2364772"/>
+            <a:ext cx="868597" cy="461665"/>
+          </a:xfrm>
+          <a:prstGeom prst="rect">
+            <a:avLst/>
+          </a:prstGeom>
+          <a:noFill/>
+        </p:spPr>
+        <p:txBody>
+          <a:bodyPr wrap="none" rtlCol="0">
+            <a:spAutoFit/>
+          </a:bodyPr>
+          <a:lstStyle/>
+          <a:p>
+            <a:r>
+              <a:rPr lang="en-US" dirty="0" smtClean="0">
+                <a:solidFill>
+                  <a:schemeClr val="tx1"/>
+                </a:solidFill>
               </a:rPr>
-              <a:t>You want a job</a:t>
-            </a:r>
-          </a:p>
-          <a:p>
-            <a:pPr lvl="1">
-              <a:spcBef>
-                <a:spcPts val="800"/>
-              </a:spcBef>
-              <a:buFont typeface="Arial" charset="0"/>
-              <a:buChar char="•"/>
-              <a:defRPr/>
-            </a:pPr>
-            <a:r>
-              <a:rPr lang="en-US" sz="3200" dirty="0">
-                <a:latin typeface="Calibri" charset="0"/>
+              <a:t>Mary</a:t>
+            </a:r>
+            <a:endParaRPr lang="en-US" dirty="0">
+              <a:solidFill>
+                <a:schemeClr val="tx1"/>
+              </a:solidFill>
+            </a:endParaRPr>
+          </a:p>
+        </p:txBody>
+      </p:sp>
+      <p:sp>
+        <p:nvSpPr>
+          <p:cNvPr id="6" name="TextBox 5"/>
+          <p:cNvSpPr txBox="1"/>
+          <p:nvPr/>
+        </p:nvSpPr>
+        <p:spPr>
+          <a:xfrm>
+            <a:off x="1219200" y="4650772"/>
+            <a:ext cx="864590" cy="461665"/>
+          </a:xfrm>
+          <a:prstGeom prst="rect">
+            <a:avLst/>
+          </a:prstGeom>
+          <a:noFill/>
+        </p:spPr>
+        <p:txBody>
+          <a:bodyPr wrap="none" rtlCol="0">
+            <a:spAutoFit/>
+          </a:bodyPr>
+          <a:lstStyle/>
+          <a:p>
+            <a:r>
+              <a:rPr lang="en-US" dirty="0" smtClean="0">
+                <a:solidFill>
+                  <a:schemeClr val="tx1"/>
+                </a:solidFill>
               </a:rPr>
-              <a:t>No one will hire a software developer that doesn’t know how to use version control</a:t>
-            </a:r>
-          </a:p>
-          <a:p>
-            <a:endParaRPr lang="en-US" dirty="0"/>
+              <a:t>Alice</a:t>
+            </a:r>
+            <a:endParaRPr lang="en-US" dirty="0">
+              <a:solidFill>
+                <a:schemeClr val="tx1"/>
+              </a:solidFill>
+            </a:endParaRPr>
           </a:p>
         </p:txBody>
       </p:sp>
     </p:spTree>
     <p:extLst>
       <p:ext uri="{BB962C8B-B14F-4D97-AF65-F5344CB8AC3E}">
-        <p14:creationId xmlns:p14="http://schemas.microsoft.com/office/powerpoint/2010/main" val="591837602"/>
+        <p14:creationId xmlns:p14="http://schemas.microsoft.com/office/powerpoint/2010/main" val="594885862"/>
       </p:ext>
     </p:extLst>
   </p:cSld>
@@ -6478,15 +6524,7 @@
           <a:p>
             <a:r>
               <a:rPr lang="en-US" dirty="0" smtClean="0"/>
-              <a:t>What is </a:t>
-            </a:r>
-            <a:r>
-              <a:rPr lang="en-US" dirty="0" err="1" smtClean="0"/>
-              <a:t>git</a:t>
-            </a:r>
-            <a:r>
-              <a:rPr lang="en-US" dirty="0" smtClean="0"/>
-              <a:t>?</a:t>
+              <a:t>Why else?</a:t>
             </a:r>
             <a:endParaRPr lang="en-US" dirty="0"/>
           </a:p>
@@ -6516,60 +6554,10 @@
               <a:defRPr/>
             </a:pPr>
             <a:r>
-              <a:rPr lang="en-US" dirty="0" err="1">
-                <a:latin typeface="Calibri" charset="0"/>
-              </a:rPr>
-              <a:t>Git</a:t>
-            </a:r>
-            <a:r>
               <a:rPr lang="en-US" dirty="0">
                 <a:latin typeface="Calibri" charset="0"/>
               </a:rPr>
-              <a:t> is the most popular version control software</a:t>
-            </a:r>
-          </a:p>
-          <a:p>
-            <a:pPr>
-              <a:spcBef>
-                <a:spcPts val="800"/>
-              </a:spcBef>
-              <a:buFont typeface="Arial" charset="0"/>
-              <a:buChar char="•"/>
-              <a:defRPr/>
-            </a:pPr>
-            <a:r>
-              <a:rPr lang="en-US" dirty="0" err="1">
-                <a:latin typeface="Calibri" charset="0"/>
-              </a:rPr>
-              <a:t>Git</a:t>
-            </a:r>
-            <a:r>
-              <a:rPr lang="en-US" dirty="0">
-                <a:latin typeface="Calibri" charset="0"/>
-              </a:rPr>
-              <a:t> is open source</a:t>
-            </a:r>
-          </a:p>
-          <a:p>
-            <a:pPr>
-              <a:spcBef>
-                <a:spcPts val="800"/>
-              </a:spcBef>
-              <a:buFont typeface="Arial" charset="0"/>
-              <a:buChar char="•"/>
-              <a:defRPr/>
-            </a:pPr>
-            <a:r>
-              <a:rPr lang="en-US" dirty="0" err="1">
-                <a:latin typeface="Calibri" charset="0"/>
-              </a:rPr>
-              <a:t>Git</a:t>
-            </a:r>
-            <a:r>
-              <a:rPr lang="en-US" dirty="0">
-                <a:latin typeface="Calibri" charset="0"/>
-              </a:rPr>
-              <a:t> runs on every platform</a:t>
+              <a:t>You want a job</a:t>
             </a:r>
           </a:p>
           <a:p>
@@ -6585,43 +6573,8 @@
               <a:rPr lang="en-US" sz="3200" dirty="0">
                 <a:latin typeface="Calibri" charset="0"/>
               </a:rPr>
-              <a:t>even Plan 9 From Outer Space</a:t>
-            </a:r>
-          </a:p>
-          <a:p>
-            <a:pPr>
-              <a:spcBef>
-                <a:spcPts val="800"/>
-              </a:spcBef>
-              <a:buFont typeface="Arial" charset="0"/>
-              <a:buChar char="•"/>
-              <a:defRPr/>
-            </a:pPr>
-            <a:r>
-              <a:rPr lang="en-US" dirty="0" err="1">
-                <a:latin typeface="Calibri" charset="0"/>
-              </a:rPr>
-              <a:t>Git</a:t>
-            </a:r>
-            <a:r>
-              <a:rPr lang="en-US" dirty="0">
-                <a:latin typeface="Calibri" charset="0"/>
-              </a:rPr>
-              <a:t> is better than all previous version control tools (in my opinion, and I’ve used quite a few)</a:t>
-            </a:r>
-          </a:p>
-          <a:p>
-            <a:pPr>
-              <a:spcBef>
-                <a:spcPts val="800"/>
-              </a:spcBef>
-              <a:buFont typeface="Arial" charset="0"/>
-              <a:buChar char="•"/>
-              <a:defRPr/>
-            </a:pPr>
-            <a:endParaRPr lang="en-US" dirty="0">
-              <a:latin typeface="Calibri" charset="0"/>
-            </a:endParaRPr>
+              <a:t>No one will hire a software developer that doesn’t know how to use version control</a:t>
+            </a:r>
           </a:p>
           <a:p>
             <a:endParaRPr lang="en-US" dirty="0"/>
@@ -6631,7 +6584,7 @@
     </p:spTree>
     <p:extLst>
       <p:ext uri="{BB962C8B-B14F-4D97-AF65-F5344CB8AC3E}">
-        <p14:creationId xmlns:p14="http://schemas.microsoft.com/office/powerpoint/2010/main" val="503709198"/>
+        <p14:creationId xmlns:p14="http://schemas.microsoft.com/office/powerpoint/2010/main" val="591837602"/>
       </p:ext>
     </p:extLst>
   </p:cSld>
@@ -6675,6 +6628,203 @@
           <a:p>
             <a:r>
               <a:rPr lang="en-US" dirty="0" smtClean="0"/>
+              <a:t>What is </a:t>
+            </a:r>
+            <a:r>
+              <a:rPr lang="en-US" dirty="0" err="1" smtClean="0"/>
+              <a:t>git</a:t>
+            </a:r>
+            <a:r>
+              <a:rPr lang="en-US" dirty="0" smtClean="0"/>
+              <a:t>?</a:t>
+            </a:r>
+            <a:endParaRPr lang="en-US" dirty="0"/>
+          </a:p>
+        </p:txBody>
+      </p:sp>
+      <p:sp>
+        <p:nvSpPr>
+          <p:cNvPr id="3" name="Content Placeholder 2"/>
+          <p:cNvSpPr>
+            <a:spLocks noGrp="1"/>
+          </p:cNvSpPr>
+          <p:nvPr>
+            <p:ph idx="1"/>
+          </p:nvPr>
+        </p:nvSpPr>
+        <p:spPr/>
+        <p:txBody>
+          <a:bodyPr/>
+          <a:lstStyle/>
+          <a:p>
+            <a:pPr>
+              <a:spcBef>
+                <a:spcPts val="800"/>
+              </a:spcBef>
+              <a:buFont typeface="Arial" charset="0"/>
+              <a:buChar char="•"/>
+              <a:defRPr/>
+            </a:pPr>
+            <a:r>
+              <a:rPr lang="en-US" dirty="0" err="1">
+                <a:latin typeface="Calibri" charset="0"/>
+              </a:rPr>
+              <a:t>Git</a:t>
+            </a:r>
+            <a:r>
+              <a:rPr lang="en-US" dirty="0">
+                <a:latin typeface="Calibri" charset="0"/>
+              </a:rPr>
+              <a:t> is the most popular version control software</a:t>
+            </a:r>
+          </a:p>
+          <a:p>
+            <a:pPr>
+              <a:spcBef>
+                <a:spcPts val="800"/>
+              </a:spcBef>
+              <a:buFont typeface="Arial" charset="0"/>
+              <a:buChar char="•"/>
+              <a:defRPr/>
+            </a:pPr>
+            <a:r>
+              <a:rPr lang="en-US" dirty="0" err="1">
+                <a:latin typeface="Calibri" charset="0"/>
+              </a:rPr>
+              <a:t>Git</a:t>
+            </a:r>
+            <a:r>
+              <a:rPr lang="en-US" dirty="0">
+                <a:latin typeface="Calibri" charset="0"/>
+              </a:rPr>
+              <a:t> is open source</a:t>
+            </a:r>
+          </a:p>
+          <a:p>
+            <a:pPr>
+              <a:spcBef>
+                <a:spcPts val="800"/>
+              </a:spcBef>
+              <a:buFont typeface="Arial" charset="0"/>
+              <a:buChar char="•"/>
+              <a:defRPr/>
+            </a:pPr>
+            <a:r>
+              <a:rPr lang="en-US" dirty="0" err="1">
+                <a:latin typeface="Calibri" charset="0"/>
+              </a:rPr>
+              <a:t>Git</a:t>
+            </a:r>
+            <a:r>
+              <a:rPr lang="en-US" dirty="0">
+                <a:latin typeface="Calibri" charset="0"/>
+              </a:rPr>
+              <a:t> runs on every platform</a:t>
+            </a:r>
+          </a:p>
+          <a:p>
+            <a:pPr lvl="1">
+              <a:spcBef>
+                <a:spcPts val="800"/>
+              </a:spcBef>
+              <a:buFont typeface="Arial" charset="0"/>
+              <a:buChar char="•"/>
+              <a:defRPr/>
+            </a:pPr>
+            <a:r>
+              <a:rPr lang="en-US" sz="3200" dirty="0">
+                <a:latin typeface="Calibri" charset="0"/>
+              </a:rPr>
+              <a:t>even Plan 9 From Outer Space</a:t>
+            </a:r>
+          </a:p>
+          <a:p>
+            <a:pPr>
+              <a:spcBef>
+                <a:spcPts val="800"/>
+              </a:spcBef>
+              <a:buFont typeface="Arial" charset="0"/>
+              <a:buChar char="•"/>
+              <a:defRPr/>
+            </a:pPr>
+            <a:r>
+              <a:rPr lang="en-US" dirty="0" err="1">
+                <a:latin typeface="Calibri" charset="0"/>
+              </a:rPr>
+              <a:t>Git</a:t>
+            </a:r>
+            <a:r>
+              <a:rPr lang="en-US" dirty="0">
+                <a:latin typeface="Calibri" charset="0"/>
+              </a:rPr>
+              <a:t> is better than all previous version control tools (in my opinion, and I’ve used quite a few)</a:t>
+            </a:r>
+          </a:p>
+          <a:p>
+            <a:pPr>
+              <a:spcBef>
+                <a:spcPts val="800"/>
+              </a:spcBef>
+              <a:buFont typeface="Arial" charset="0"/>
+              <a:buChar char="•"/>
+              <a:defRPr/>
+            </a:pPr>
+            <a:endParaRPr lang="en-US" dirty="0">
+              <a:latin typeface="Calibri" charset="0"/>
+            </a:endParaRPr>
+          </a:p>
+          <a:p>
+            <a:endParaRPr lang="en-US" dirty="0"/>
+          </a:p>
+        </p:txBody>
+      </p:sp>
+    </p:spTree>
+    <p:extLst>
+      <p:ext uri="{BB962C8B-B14F-4D97-AF65-F5344CB8AC3E}">
+        <p14:creationId xmlns:p14="http://schemas.microsoft.com/office/powerpoint/2010/main" val="503709198"/>
+      </p:ext>
+    </p:extLst>
+  </p:cSld>
+  <p:clrMapOvr>
+    <a:masterClrMapping/>
+  </p:clrMapOvr>
+</p:sld>
+</file>
+
+<file path=ppt/slides/slide15.xml><?xml version="1.0" encoding="utf-8"?>
+<p:sld xmlns:a="http://schemas.openxmlformats.org/drawingml/2006/main" xmlns:r="http://schemas.openxmlformats.org/officeDocument/2006/relationships" xmlns:p="http://schemas.openxmlformats.org/presentationml/2006/main">
+  <p:cSld>
+    <p:spTree>
+      <p:nvGrpSpPr>
+        <p:cNvPr id="1" name=""/>
+        <p:cNvGrpSpPr/>
+        <p:nvPr/>
+      </p:nvGrpSpPr>
+      <p:grpSpPr>
+        <a:xfrm>
+          <a:off x="0" y="0"/>
+          <a:ext cx="0" cy="0"/>
+          <a:chOff x="0" y="0"/>
+          <a:chExt cx="0" cy="0"/>
+        </a:xfrm>
+      </p:grpSpPr>
+      <p:sp>
+        <p:nvSpPr>
+          <p:cNvPr id="2" name="Title 1"/>
+          <p:cNvSpPr>
+            <a:spLocks noGrp="1"/>
+          </p:cNvSpPr>
+          <p:nvPr>
+            <p:ph type="title"/>
+          </p:nvPr>
+        </p:nvSpPr>
+        <p:spPr/>
+        <p:txBody>
+          <a:bodyPr/>
+          <a:lstStyle/>
+          <a:p>
+            <a:r>
+              <a:rPr lang="en-US" dirty="0" smtClean="0"/>
               <a:t>What is GitHub?</a:t>
             </a:r>
             <a:endParaRPr lang="en-US" dirty="0"/>
@@ -6826,7 +6976,7 @@
 </p:sld>
 </file>
 
-<file path=ppt/slides/slide15.xml><?xml version="1.0" encoding="utf-8"?>
+<file path=ppt/slides/slide16.xml><?xml version="1.0" encoding="utf-8"?>
 <p:sld xmlns:a="http://schemas.openxmlformats.org/drawingml/2006/main" xmlns:r="http://schemas.openxmlformats.org/officeDocument/2006/relationships" xmlns:p="http://schemas.openxmlformats.org/presentationml/2006/main">
   <p:cSld>
     <p:spTree>
@@ -6871,88 +7021,6 @@
     <p:extLst>
       <p:ext uri="{BB962C8B-B14F-4D97-AF65-F5344CB8AC3E}">
         <p14:creationId xmlns:p14="http://schemas.microsoft.com/office/powerpoint/2010/main" val="939614745"/>
-      </p:ext>
-    </p:extLst>
-  </p:cSld>
-  <p:clrMapOvr>
-    <a:masterClrMapping/>
-  </p:clrMapOvr>
-  <p:transition spd="med"/>
-  <p:timing>
-    <p:tnLst>
-      <p:par>
-        <p:cTn id="1" dur="indefinite" restart="never" nodeType="tmRoot">
-          <p:childTnLst>
-            <p:seq concurrent="1" nextAc="seek">
-              <p:cTn id="2" dur="0" nodeType="mainSeq"/>
-              <p:prevCondLst>
-                <p:cond evt="onPrev" delay="0">
-                  <p:tgtEl>
-                    <p:sldTgt/>
-                  </p:tgtEl>
-                </p:cond>
-              </p:prevCondLst>
-              <p:nextCondLst>
-                <p:cond evt="onNext" delay="0">
-                  <p:tgtEl>
-                    <p:sldTgt/>
-                  </p:tgtEl>
-                </p:cond>
-              </p:nextCondLst>
-            </p:seq>
-          </p:childTnLst>
-        </p:cTn>
-      </p:par>
-    </p:tnLst>
-  </p:timing>
-</p:sld>
-</file>
-
-<file path=ppt/slides/slide16.xml><?xml version="1.0" encoding="utf-8"?>
-<p:sld xmlns:a="http://schemas.openxmlformats.org/drawingml/2006/main" xmlns:r="http://schemas.openxmlformats.org/officeDocument/2006/relationships" xmlns:p="http://schemas.openxmlformats.org/presentationml/2006/main">
-  <p:cSld>
-    <p:spTree>
-      <p:nvGrpSpPr>
-        <p:cNvPr id="1" name=""/>
-        <p:cNvGrpSpPr/>
-        <p:nvPr/>
-      </p:nvGrpSpPr>
-      <p:grpSpPr>
-        <a:xfrm>
-          <a:off x="0" y="0"/>
-          <a:ext cx="0" cy="0"/>
-          <a:chOff x="0" y="0"/>
-          <a:chExt cx="0" cy="0"/>
-        </a:xfrm>
-      </p:grpSpPr>
-      <p:pic>
-        <p:nvPicPr>
-          <p:cNvPr id="4" name="Picture 3"/>
-          <p:cNvPicPr>
-            <a:picLocks noChangeAspect="1"/>
-          </p:cNvPicPr>
-          <p:nvPr/>
-        </p:nvPicPr>
-        <p:blipFill>
-          <a:blip r:embed="rId3"/>
-          <a:stretch>
-            <a:fillRect/>
-          </a:stretch>
-        </p:blipFill>
-        <p:spPr>
-          <a:xfrm>
-            <a:off x="508000" y="977900"/>
-            <a:ext cx="8115300" cy="4902200"/>
-          </a:xfrm>
-          <a:prstGeom prst="rect">
-            <a:avLst/>
-          </a:prstGeom>
-        </p:spPr>
-      </p:pic>
-    </p:spTree>
-    <p:extLst>
-      <p:ext uri="{BB962C8B-B14F-4D97-AF65-F5344CB8AC3E}">
-        <p14:creationId xmlns:p14="http://schemas.microsoft.com/office/powerpoint/2010/main" val="566946790"/>
       </p:ext>
     </p:extLst>
   </p:cSld>
@@ -7009,7 +7077,7 @@
       </p:grpSpPr>
       <p:pic>
         <p:nvPicPr>
-          <p:cNvPr id="2" name="Picture 1"/>
+          <p:cNvPr id="4" name="Picture 3"/>
           <p:cNvPicPr>
             <a:picLocks noChangeAspect="1"/>
           </p:cNvPicPr>
@@ -7023,8 +7091,8 @@
         </p:blipFill>
         <p:spPr>
           <a:xfrm>
-            <a:off x="901700" y="952500"/>
-            <a:ext cx="7340600" cy="4940300"/>
+            <a:off x="508000" y="977900"/>
+            <a:ext cx="8115300" cy="4902200"/>
           </a:xfrm>
           <a:prstGeom prst="rect">
             <a:avLst/>
@@ -7034,7 +7102,7 @@
     </p:spTree>
     <p:extLst>
       <p:ext uri="{BB962C8B-B14F-4D97-AF65-F5344CB8AC3E}">
-        <p14:creationId xmlns:p14="http://schemas.microsoft.com/office/powerpoint/2010/main" val="1613765588"/>
+        <p14:creationId xmlns:p14="http://schemas.microsoft.com/office/powerpoint/2010/main" val="566946790"/>
       </p:ext>
     </p:extLst>
   </p:cSld>
@@ -7091,7 +7159,7 @@
       </p:grpSpPr>
       <p:pic>
         <p:nvPicPr>
-          <p:cNvPr id="4" name="Picture 3"/>
+          <p:cNvPr id="2" name="Picture 1"/>
           <p:cNvPicPr>
             <a:picLocks noChangeAspect="1"/>
           </p:cNvPicPr>
@@ -7105,8 +7173,8 @@
         </p:blipFill>
         <p:spPr>
           <a:xfrm>
-            <a:off x="0" y="2336800"/>
-            <a:ext cx="9144000" cy="2163223"/>
+            <a:off x="901700" y="952500"/>
+            <a:ext cx="7340600" cy="4940300"/>
           </a:xfrm>
           <a:prstGeom prst="rect">
             <a:avLst/>
@@ -7116,7 +7184,7 @@
     </p:spTree>
     <p:extLst>
       <p:ext uri="{BB962C8B-B14F-4D97-AF65-F5344CB8AC3E}">
-        <p14:creationId xmlns:p14="http://schemas.microsoft.com/office/powerpoint/2010/main" val="58145480"/>
+        <p14:creationId xmlns:p14="http://schemas.microsoft.com/office/powerpoint/2010/main" val="1613765588"/>
       </p:ext>
     </p:extLst>
   </p:cSld>
@@ -7173,7 +7241,7 @@
       </p:grpSpPr>
       <p:pic>
         <p:nvPicPr>
-          <p:cNvPr id="2" name="Picture 1"/>
+          <p:cNvPr id="4" name="Picture 3"/>
           <p:cNvPicPr>
             <a:picLocks noChangeAspect="1"/>
           </p:cNvPicPr>
@@ -7187,8 +7255,8 @@
         </p:blipFill>
         <p:spPr>
           <a:xfrm>
-            <a:off x="0" y="774700"/>
-            <a:ext cx="9144000" cy="5294489"/>
+            <a:off x="0" y="2336800"/>
+            <a:ext cx="9144000" cy="2163223"/>
           </a:xfrm>
           <a:prstGeom prst="rect">
             <a:avLst/>
@@ -7198,7 +7266,7 @@
     </p:spTree>
     <p:extLst>
       <p:ext uri="{BB962C8B-B14F-4D97-AF65-F5344CB8AC3E}">
-        <p14:creationId xmlns:p14="http://schemas.microsoft.com/office/powerpoint/2010/main" val="1781815951"/>
+        <p14:creationId xmlns:p14="http://schemas.microsoft.com/office/powerpoint/2010/main" val="58145480"/>
       </p:ext>
     </p:extLst>
   </p:cSld>
@@ -7409,13 +7477,7 @@
               <a:rPr lang="en-US" dirty="0" smtClean="0">
                 <a:latin typeface="Calibri" charset="0"/>
               </a:rPr>
-              <a:t>Why aren’t we using an Integrated </a:t>
-            </a:r>
-            <a:r>
-              <a:rPr lang="en-US" smtClean="0">
-                <a:latin typeface="Calibri" charset="0"/>
-              </a:rPr>
-              <a:t>Development Environment (IDE) for our Python work?</a:t>
+              <a:t>Why aren’t we using an Integrated Development Environment (IDE) for our Python work?</a:t>
             </a:r>
             <a:endParaRPr lang="en-US" dirty="0"/>
           </a:p>
@@ -7453,7 +7515,7 @@
       </p:grpSpPr>
       <p:pic>
         <p:nvPicPr>
-          <p:cNvPr id="4" name="Picture 3"/>
+          <p:cNvPr id="2" name="Picture 1"/>
           <p:cNvPicPr>
             <a:picLocks noChangeAspect="1"/>
           </p:cNvPicPr>
@@ -7467,8 +7529,8 @@
         </p:blipFill>
         <p:spPr>
           <a:xfrm>
-            <a:off x="0" y="800100"/>
-            <a:ext cx="9144000" cy="5235048"/>
+            <a:off x="0" y="774700"/>
+            <a:ext cx="9144000" cy="5294489"/>
           </a:xfrm>
           <a:prstGeom prst="rect">
             <a:avLst/>
@@ -7478,7 +7540,7 @@
     </p:spTree>
     <p:extLst>
       <p:ext uri="{BB962C8B-B14F-4D97-AF65-F5344CB8AC3E}">
-        <p14:creationId xmlns:p14="http://schemas.microsoft.com/office/powerpoint/2010/main" val="156234336"/>
+        <p14:creationId xmlns:p14="http://schemas.microsoft.com/office/powerpoint/2010/main" val="1781815951"/>
       </p:ext>
     </p:extLst>
   </p:cSld>
@@ -7535,7 +7597,7 @@
       </p:grpSpPr>
       <p:pic>
         <p:nvPicPr>
-          <p:cNvPr id="2" name="Picture 1"/>
+          <p:cNvPr id="4" name="Picture 3"/>
           <p:cNvPicPr>
             <a:picLocks noChangeAspect="1"/>
           </p:cNvPicPr>
@@ -7549,8 +7611,8 @@
         </p:blipFill>
         <p:spPr>
           <a:xfrm>
-            <a:off x="444500" y="12700"/>
-            <a:ext cx="8255000" cy="6819900"/>
+            <a:off x="0" y="800100"/>
+            <a:ext cx="9144000" cy="5235048"/>
           </a:xfrm>
           <a:prstGeom prst="rect">
             <a:avLst/>
@@ -7560,7 +7622,7 @@
     </p:spTree>
     <p:extLst>
       <p:ext uri="{BB962C8B-B14F-4D97-AF65-F5344CB8AC3E}">
-        <p14:creationId xmlns:p14="http://schemas.microsoft.com/office/powerpoint/2010/main" val="2124841118"/>
+        <p14:creationId xmlns:p14="http://schemas.microsoft.com/office/powerpoint/2010/main" val="156234336"/>
       </p:ext>
     </p:extLst>
   </p:cSld>
@@ -7617,7 +7679,7 @@
       </p:grpSpPr>
       <p:pic>
         <p:nvPicPr>
-          <p:cNvPr id="5" name="Picture 4"/>
+          <p:cNvPr id="2" name="Picture 1"/>
           <p:cNvPicPr>
             <a:picLocks noChangeAspect="1"/>
           </p:cNvPicPr>
@@ -7631,8 +7693,8 @@
         </p:blipFill>
         <p:spPr>
           <a:xfrm>
-            <a:off x="3238500" y="2286000"/>
-            <a:ext cx="2654300" cy="2286000"/>
+            <a:off x="444500" y="12700"/>
+            <a:ext cx="8255000" cy="6819900"/>
           </a:xfrm>
           <a:prstGeom prst="rect">
             <a:avLst/>
@@ -7642,7 +7704,7 @@
     </p:spTree>
     <p:extLst>
       <p:ext uri="{BB962C8B-B14F-4D97-AF65-F5344CB8AC3E}">
-        <p14:creationId xmlns:p14="http://schemas.microsoft.com/office/powerpoint/2010/main" val="1755294082"/>
+        <p14:creationId xmlns:p14="http://schemas.microsoft.com/office/powerpoint/2010/main" val="2124841118"/>
       </p:ext>
     </p:extLst>
   </p:cSld>
@@ -7699,7 +7761,7 @@
       </p:grpSpPr>
       <p:pic>
         <p:nvPicPr>
-          <p:cNvPr id="2" name="Picture 1"/>
+          <p:cNvPr id="5" name="Picture 4"/>
           <p:cNvPicPr>
             <a:picLocks noChangeAspect="1"/>
           </p:cNvPicPr>
@@ -7713,8 +7775,8 @@
         </p:blipFill>
         <p:spPr>
           <a:xfrm>
-            <a:off x="0" y="393700"/>
-            <a:ext cx="9144000" cy="6046470"/>
+            <a:off x="3238500" y="2286000"/>
+            <a:ext cx="2654300" cy="2286000"/>
           </a:xfrm>
           <a:prstGeom prst="rect">
             <a:avLst/>
@@ -7724,7 +7786,7 @@
     </p:spTree>
     <p:extLst>
       <p:ext uri="{BB962C8B-B14F-4D97-AF65-F5344CB8AC3E}">
-        <p14:creationId xmlns:p14="http://schemas.microsoft.com/office/powerpoint/2010/main" val="186980271"/>
+        <p14:creationId xmlns:p14="http://schemas.microsoft.com/office/powerpoint/2010/main" val="1755294082"/>
       </p:ext>
     </p:extLst>
   </p:cSld>
@@ -7781,7 +7843,7 @@
       </p:grpSpPr>
       <p:pic>
         <p:nvPicPr>
-          <p:cNvPr id="4" name="Picture 3"/>
+          <p:cNvPr id="2" name="Picture 1"/>
           <p:cNvPicPr>
             <a:picLocks noChangeAspect="1"/>
           </p:cNvPicPr>
@@ -7795,8 +7857,8 @@
         </p:blipFill>
         <p:spPr>
           <a:xfrm>
-            <a:off x="0" y="1968500"/>
-            <a:ext cx="9144000" cy="2904024"/>
+            <a:off x="0" y="393700"/>
+            <a:ext cx="9144000" cy="6046470"/>
           </a:xfrm>
           <a:prstGeom prst="rect">
             <a:avLst/>
@@ -7806,7 +7868,7 @@
     </p:spTree>
     <p:extLst>
       <p:ext uri="{BB962C8B-B14F-4D97-AF65-F5344CB8AC3E}">
-        <p14:creationId xmlns:p14="http://schemas.microsoft.com/office/powerpoint/2010/main" val="587873242"/>
+        <p14:creationId xmlns:p14="http://schemas.microsoft.com/office/powerpoint/2010/main" val="186980271"/>
       </p:ext>
     </p:extLst>
   </p:cSld>
@@ -7863,7 +7925,7 @@
       </p:grpSpPr>
       <p:pic>
         <p:nvPicPr>
-          <p:cNvPr id="2" name="Picture 1"/>
+          <p:cNvPr id="4" name="Picture 3"/>
           <p:cNvPicPr>
             <a:picLocks noChangeAspect="1"/>
           </p:cNvPicPr>
@@ -7877,8 +7939,8 @@
         </p:blipFill>
         <p:spPr>
           <a:xfrm>
-            <a:off x="1104900" y="0"/>
-            <a:ext cx="6910485" cy="6858000"/>
+            <a:off x="0" y="1968500"/>
+            <a:ext cx="9144000" cy="2904024"/>
           </a:xfrm>
           <a:prstGeom prst="rect">
             <a:avLst/>
@@ -7888,7 +7950,7 @@
     </p:spTree>
     <p:extLst>
       <p:ext uri="{BB962C8B-B14F-4D97-AF65-F5344CB8AC3E}">
-        <p14:creationId xmlns:p14="http://schemas.microsoft.com/office/powerpoint/2010/main" val="2064230643"/>
+        <p14:creationId xmlns:p14="http://schemas.microsoft.com/office/powerpoint/2010/main" val="587873242"/>
       </p:ext>
     </p:extLst>
   </p:cSld>
@@ -7945,7 +8007,7 @@
       </p:grpSpPr>
       <p:pic>
         <p:nvPicPr>
-          <p:cNvPr id="4" name="Picture 3"/>
+          <p:cNvPr id="2" name="Picture 1"/>
           <p:cNvPicPr>
             <a:picLocks noChangeAspect="1"/>
           </p:cNvPicPr>
@@ -7959,8 +8021,8 @@
         </p:blipFill>
         <p:spPr>
           <a:xfrm>
-            <a:off x="622300" y="0"/>
-            <a:ext cx="7879136" cy="6858000"/>
+            <a:off x="1104900" y="0"/>
+            <a:ext cx="6910485" cy="6858000"/>
           </a:xfrm>
           <a:prstGeom prst="rect">
             <a:avLst/>
@@ -7970,7 +8032,7 @@
     </p:spTree>
     <p:extLst>
       <p:ext uri="{BB962C8B-B14F-4D97-AF65-F5344CB8AC3E}">
-        <p14:creationId xmlns:p14="http://schemas.microsoft.com/office/powerpoint/2010/main" val="2142256303"/>
+        <p14:creationId xmlns:p14="http://schemas.microsoft.com/office/powerpoint/2010/main" val="2064230643"/>
       </p:ext>
     </p:extLst>
   </p:cSld>
@@ -8027,6 +8089,88 @@
       </p:grpSpPr>
       <p:pic>
         <p:nvPicPr>
+          <p:cNvPr id="4" name="Picture 3"/>
+          <p:cNvPicPr>
+            <a:picLocks noChangeAspect="1"/>
+          </p:cNvPicPr>
+          <p:nvPr/>
+        </p:nvPicPr>
+        <p:blipFill>
+          <a:blip r:embed="rId3"/>
+          <a:stretch>
+            <a:fillRect/>
+          </a:stretch>
+        </p:blipFill>
+        <p:spPr>
+          <a:xfrm>
+            <a:off x="622300" y="0"/>
+            <a:ext cx="7879136" cy="6858000"/>
+          </a:xfrm>
+          <a:prstGeom prst="rect">
+            <a:avLst/>
+          </a:prstGeom>
+        </p:spPr>
+      </p:pic>
+    </p:spTree>
+    <p:extLst>
+      <p:ext uri="{BB962C8B-B14F-4D97-AF65-F5344CB8AC3E}">
+        <p14:creationId xmlns:p14="http://schemas.microsoft.com/office/powerpoint/2010/main" val="2142256303"/>
+      </p:ext>
+    </p:extLst>
+  </p:cSld>
+  <p:clrMapOvr>
+    <a:masterClrMapping/>
+  </p:clrMapOvr>
+  <p:transition spd="med"/>
+  <p:timing>
+    <p:tnLst>
+      <p:par>
+        <p:cTn id="1" dur="indefinite" restart="never" nodeType="tmRoot">
+          <p:childTnLst>
+            <p:seq concurrent="1" nextAc="seek">
+              <p:cTn id="2" dur="0" nodeType="mainSeq"/>
+              <p:prevCondLst>
+                <p:cond evt="onPrev" delay="0">
+                  <p:tgtEl>
+                    <p:sldTgt/>
+                  </p:tgtEl>
+                </p:cond>
+              </p:prevCondLst>
+              <p:nextCondLst>
+                <p:cond evt="onNext" delay="0">
+                  <p:tgtEl>
+                    <p:sldTgt/>
+                  </p:tgtEl>
+                </p:cond>
+              </p:nextCondLst>
+            </p:seq>
+          </p:childTnLst>
+        </p:cTn>
+      </p:par>
+    </p:tnLst>
+  </p:timing>
+</p:sld>
+</file>
+
+<file path=ppt/slides/slide28.xml><?xml version="1.0" encoding="utf-8"?>
+<p:sld xmlns:a="http://schemas.openxmlformats.org/drawingml/2006/main" xmlns:r="http://schemas.openxmlformats.org/officeDocument/2006/relationships" xmlns:p="http://schemas.openxmlformats.org/presentationml/2006/main">
+  <p:cSld>
+    <p:spTree>
+      <p:nvGrpSpPr>
+        <p:cNvPr id="1" name=""/>
+        <p:cNvGrpSpPr/>
+        <p:nvPr/>
+      </p:nvGrpSpPr>
+      <p:grpSpPr>
+        <a:xfrm>
+          <a:off x="0" y="0"/>
+          <a:ext cx="0" cy="0"/>
+          <a:chOff x="0" y="0"/>
+          <a:chExt cx="0" cy="0"/>
+        </a:xfrm>
+      </p:grpSpPr>
+      <p:pic>
+        <p:nvPicPr>
           <p:cNvPr id="2" name="Picture 1"/>
           <p:cNvPicPr>
             <a:picLocks noChangeAspect="1"/>
@@ -8096,7 +8240,7 @@
           <a:p>
             <a:r>
               <a:rPr lang="en-US" dirty="0" smtClean="0"/>
-              <a:t>Overview</a:t>
+              <a:t>Markdown</a:t>
             </a:r>
             <a:endParaRPr lang="en-US" dirty="0"/>
           </a:p>
@@ -8126,14 +8270,14 @@
               <a:defRPr/>
             </a:pPr>
             <a:r>
-              <a:rPr lang="en-US" dirty="0">
+              <a:rPr lang="en-US" dirty="0" smtClean="0">
                 <a:latin typeface="Calibri" charset="0"/>
               </a:rPr>
-              <a:t>What is version control?</a:t>
-            </a:r>
-          </a:p>
-          <a:p>
-            <a:pPr>
+              <a:t>Let us all go to</a:t>
+            </a:r>
+          </a:p>
+          <a:p>
+            <a:pPr lvl="1">
               <a:spcBef>
                 <a:spcPts val="800"/>
               </a:spcBef>
@@ -8143,13 +8287,26 @@
             </a:pPr>
             <a:r>
               <a:rPr lang="en-US" dirty="0">
-                <a:latin typeface="Calibri" charset="0"/>
+                <a:hlinkClick r:id="rId2"/>
               </a:rPr>
-              <a:t>Why do I need version control?</a:t>
-            </a:r>
-          </a:p>
-          <a:p>
-            <a:pPr>
+              <a:t>https://</a:t>
+            </a:r>
+            <a:r>
+              <a:rPr lang="en-US" dirty="0" smtClean="0">
+                <a:hlinkClick r:id="rId2"/>
+              </a:rPr>
+              <a:t>jbt.github.io</a:t>
+            </a:r>
+            <a:r>
+              <a:rPr lang="en-US" smtClean="0">
+                <a:hlinkClick r:id="rId2"/>
+              </a:rPr>
+              <a:t>/markdown-editor</a:t>
+            </a:r>
+            <a:endParaRPr lang="en-US" smtClean="0"/>
+          </a:p>
+          <a:p>
+            <a:pPr lvl="1">
               <a:spcBef>
                 <a:spcPts val="800"/>
               </a:spcBef>
@@ -8157,42 +8314,6 @@
               <a:buChar char="•"/>
               <a:defRPr/>
             </a:pPr>
-            <a:r>
-              <a:rPr lang="en-US" dirty="0">
-                <a:latin typeface="Calibri" charset="0"/>
-              </a:rPr>
-              <a:t>What are </a:t>
-            </a:r>
-            <a:r>
-              <a:rPr lang="en-US" dirty="0" err="1">
-                <a:latin typeface="Calibri" charset="0"/>
-              </a:rPr>
-              <a:t>git</a:t>
-            </a:r>
-            <a:r>
-              <a:rPr lang="en-US" dirty="0">
-                <a:latin typeface="Calibri" charset="0"/>
-              </a:rPr>
-              <a:t> and GitHub?</a:t>
-            </a:r>
-          </a:p>
-          <a:p>
-            <a:pPr>
-              <a:spcBef>
-                <a:spcPts val="800"/>
-              </a:spcBef>
-              <a:buFont typeface="Arial" charset="0"/>
-              <a:buChar char="•"/>
-              <a:defRPr/>
-            </a:pPr>
-            <a:r>
-              <a:rPr lang="en-US" dirty="0">
-                <a:latin typeface="Calibri" charset="0"/>
-              </a:rPr>
-              <a:t>Hands-on guided tour</a:t>
-            </a:r>
-          </a:p>
-          <a:p>
             <a:endParaRPr lang="en-US" dirty="0"/>
           </a:p>
         </p:txBody>
@@ -8200,7 +8321,7 @@
     </p:spTree>
     <p:extLst>
       <p:ext uri="{BB962C8B-B14F-4D97-AF65-F5344CB8AC3E}">
-        <p14:creationId xmlns:p14="http://schemas.microsoft.com/office/powerpoint/2010/main" val="994220001"/>
+        <p14:creationId xmlns:p14="http://schemas.microsoft.com/office/powerpoint/2010/main" val="1674195380"/>
       </p:ext>
     </p:extLst>
   </p:cSld>
@@ -8244,7 +8365,7 @@
           <a:p>
             <a:r>
               <a:rPr lang="en-US" dirty="0" smtClean="0"/>
-              <a:t>What is version control?</a:t>
+              <a:t>Overview</a:t>
             </a:r>
             <a:endParaRPr lang="en-US" dirty="0"/>
           </a:p>
@@ -8277,17 +8398,11 @@
               <a:rPr lang="en-US" dirty="0">
                 <a:latin typeface="Calibri" charset="0"/>
               </a:rPr>
-              <a:t>Writing a manuscript</a:t>
-            </a:r>
-            <a:r>
-              <a:rPr lang="is-IS" dirty="0">
-                <a:latin typeface="Calibri" charset="0"/>
-              </a:rPr>
-              <a:t>…</a:t>
-            </a:r>
-          </a:p>
-          <a:p>
-            <a:pPr lvl="1">
+              <a:t>What is version control?</a:t>
+            </a:r>
+          </a:p>
+          <a:p>
+            <a:pPr>
               <a:spcBef>
                 <a:spcPts val="800"/>
               </a:spcBef>
@@ -8296,14 +8411,14 @@
               <a:defRPr/>
             </a:pPr>
             <a:r>
-              <a:rPr lang="is-IS" sz="3200" dirty="0">
+              <a:rPr lang="en-US" dirty="0">
                 <a:latin typeface="Calibri" charset="0"/>
               </a:rPr>
-              <a:t>Use undo to revert to a previous state</a:t>
-            </a:r>
-          </a:p>
-          <a:p>
-            <a:pPr lvl="1">
+              <a:t>Why do I need version control?</a:t>
+            </a:r>
+          </a:p>
+          <a:p>
+            <a:pPr>
               <a:spcBef>
                 <a:spcPts val="800"/>
               </a:spcBef>
@@ -8312,18 +8427,49 @@
               <a:defRPr/>
             </a:pPr>
             <a:r>
-              <a:rPr lang="is-IS" sz="3200" dirty="0">
+              <a:rPr lang="en-US" dirty="0">
                 <a:latin typeface="Calibri" charset="0"/>
               </a:rPr>
-              <a:t>Use track changes when sharing doc with your advisor</a:t>
-            </a:r>
+              <a:t>What are </a:t>
+            </a:r>
+            <a:r>
+              <a:rPr lang="en-US" dirty="0" err="1">
+                <a:latin typeface="Calibri" charset="0"/>
+              </a:rPr>
+              <a:t>git</a:t>
+            </a:r>
+            <a:r>
+              <a:rPr lang="en-US" dirty="0">
+                <a:latin typeface="Calibri" charset="0"/>
+              </a:rPr>
+              <a:t> and GitHub?</a:t>
+            </a:r>
+          </a:p>
+          <a:p>
+            <a:pPr>
+              <a:spcBef>
+                <a:spcPts val="800"/>
+              </a:spcBef>
+              <a:buFont typeface="Arial" charset="0"/>
+              <a:buChar char="•"/>
+              <a:defRPr/>
+            </a:pPr>
+            <a:r>
+              <a:rPr lang="en-US" dirty="0">
+                <a:latin typeface="Calibri" charset="0"/>
+              </a:rPr>
+              <a:t>Hands-on guided tour</a:t>
+            </a:r>
+          </a:p>
+          <a:p>
+            <a:endParaRPr lang="en-US" dirty="0"/>
           </a:p>
         </p:txBody>
       </p:sp>
     </p:spTree>
     <p:extLst>
       <p:ext uri="{BB962C8B-B14F-4D97-AF65-F5344CB8AC3E}">
-        <p14:creationId xmlns:p14="http://schemas.microsoft.com/office/powerpoint/2010/main" val="1500148518"/>
+        <p14:creationId xmlns:p14="http://schemas.microsoft.com/office/powerpoint/2010/main" val="994220001"/>
       </p:ext>
     </p:extLst>
   </p:cSld>
@@ -8367,7 +8513,7 @@
           <a:p>
             <a:r>
               <a:rPr lang="en-US" dirty="0" smtClean="0"/>
-              <a:t>What is version control</a:t>
+              <a:t>What is version control?</a:t>
             </a:r>
             <a:endParaRPr lang="en-US" dirty="0"/>
           </a:p>
@@ -8397,10 +8543,16 @@
               <a:defRPr/>
             </a:pPr>
             <a:r>
+              <a:rPr lang="en-US" dirty="0">
+                <a:latin typeface="Calibri" charset="0"/>
+              </a:rPr>
+              <a:t>Writing a manuscript</a:t>
+            </a:r>
+            <a:r>
               <a:rPr lang="is-IS" dirty="0">
                 <a:latin typeface="Calibri" charset="0"/>
               </a:rPr>
-              <a:t>Version control is like a combination of undo and track changes for your code</a:t>
+              <a:t>…</a:t>
             </a:r>
           </a:p>
           <a:p>
@@ -8416,7 +8568,7 @@
               <a:rPr lang="is-IS" sz="3200" dirty="0">
                 <a:latin typeface="Calibri" charset="0"/>
               </a:rPr>
-              <a:t>You can revert to previous versions of code</a:t>
+              <a:t>Use undo to revert to a previous state</a:t>
             </a:r>
           </a:p>
           <a:p>
@@ -8432,50 +8584,15 @@
               <a:rPr lang="is-IS" sz="3200" dirty="0">
                 <a:latin typeface="Calibri" charset="0"/>
               </a:rPr>
-              <a:t>You can easily identify who contributed what</a:t>
-            </a:r>
-          </a:p>
-          <a:p>
-            <a:pPr lvl="1">
-              <a:spcBef>
-                <a:spcPts val="800"/>
-              </a:spcBef>
-              <a:buFont typeface="Arial" charset="0"/>
-              <a:buChar char="•"/>
-              <a:defRPr/>
-            </a:pPr>
-            <a:endParaRPr lang="is-IS" sz="3200" dirty="0">
-              <a:latin typeface="Calibri" charset="0"/>
-            </a:endParaRPr>
-          </a:p>
-          <a:p>
-            <a:pPr lvl="1">
-              <a:spcBef>
-                <a:spcPts val="800"/>
-              </a:spcBef>
-              <a:buFont typeface="Arial" charset="0"/>
-              <a:buChar char="•"/>
-              <a:defRPr/>
-            </a:pPr>
-            <a:r>
-              <a:rPr lang="is-IS" sz="3200" dirty="0">
-                <a:latin typeface="Calibri" charset="0"/>
-              </a:rPr>
-              <a:t>Version control is about tracking versions of code and developing software with people</a:t>
-            </a:r>
-            <a:endParaRPr lang="en-US" sz="3200" dirty="0">
-              <a:latin typeface="Calibri" charset="0"/>
-            </a:endParaRPr>
-          </a:p>
-          <a:p>
-            <a:endParaRPr lang="en-US" dirty="0"/>
+              <a:t>Use track changes when sharing doc with your advisor</a:t>
+            </a:r>
           </a:p>
         </p:txBody>
       </p:sp>
     </p:spTree>
     <p:extLst>
       <p:ext uri="{BB962C8B-B14F-4D97-AF65-F5344CB8AC3E}">
-        <p14:creationId xmlns:p14="http://schemas.microsoft.com/office/powerpoint/2010/main" val="1380445033"/>
+        <p14:creationId xmlns:p14="http://schemas.microsoft.com/office/powerpoint/2010/main" val="1500148518"/>
       </p:ext>
     </p:extLst>
   </p:cSld>
@@ -8519,42 +8636,115 @@
           <a:p>
             <a:r>
               <a:rPr lang="en-US" dirty="0" smtClean="0"/>
-              <a:t>What is version control?</a:t>
+              <a:t>What is version control</a:t>
             </a:r>
             <a:endParaRPr lang="en-US" dirty="0"/>
           </a:p>
         </p:txBody>
       </p:sp>
-      <p:pic>
-        <p:nvPicPr>
-          <p:cNvPr id="4" name="Content Placeholder 3"/>
-          <p:cNvPicPr>
-            <a:picLocks noGrp="1" noChangeAspect="1"/>
-          </p:cNvPicPr>
+      <p:sp>
+        <p:nvSpPr>
+          <p:cNvPr id="3" name="Content Placeholder 2"/>
+          <p:cNvSpPr>
+            <a:spLocks noGrp="1"/>
+          </p:cNvSpPr>
           <p:nvPr>
             <p:ph idx="1"/>
           </p:nvPr>
-        </p:nvPicPr>
-        <p:blipFill>
-          <a:blip r:embed="rId2"/>
-          <a:stretch>
-            <a:fillRect/>
-          </a:stretch>
-        </p:blipFill>
-        <p:spPr>
-          <a:xfrm>
-            <a:off x="895350" y="2820987"/>
-            <a:ext cx="7353300" cy="2616200"/>
-          </a:xfrm>
-          <a:prstGeom prst="rect">
-            <a:avLst/>
-          </a:prstGeom>
-        </p:spPr>
-      </p:pic>
+        </p:nvSpPr>
+        <p:spPr/>
+        <p:txBody>
+          <a:bodyPr/>
+          <a:lstStyle/>
+          <a:p>
+            <a:pPr>
+              <a:spcBef>
+                <a:spcPts val="800"/>
+              </a:spcBef>
+              <a:buFont typeface="Arial" charset="0"/>
+              <a:buChar char="•"/>
+              <a:defRPr/>
+            </a:pPr>
+            <a:r>
+              <a:rPr lang="is-IS" dirty="0">
+                <a:latin typeface="Calibri" charset="0"/>
+              </a:rPr>
+              <a:t>Version control is like a combination of undo and track changes for your code</a:t>
+            </a:r>
+          </a:p>
+          <a:p>
+            <a:pPr lvl="1">
+              <a:spcBef>
+                <a:spcPts val="800"/>
+              </a:spcBef>
+              <a:buFont typeface="Arial" charset="0"/>
+              <a:buChar char="•"/>
+              <a:defRPr/>
+            </a:pPr>
+            <a:r>
+              <a:rPr lang="is-IS" sz="3200" dirty="0">
+                <a:latin typeface="Calibri" charset="0"/>
+              </a:rPr>
+              <a:t>You can revert to previous versions of code</a:t>
+            </a:r>
+          </a:p>
+          <a:p>
+            <a:pPr lvl="1">
+              <a:spcBef>
+                <a:spcPts val="800"/>
+              </a:spcBef>
+              <a:buFont typeface="Arial" charset="0"/>
+              <a:buChar char="•"/>
+              <a:defRPr/>
+            </a:pPr>
+            <a:r>
+              <a:rPr lang="is-IS" sz="3200" dirty="0">
+                <a:latin typeface="Calibri" charset="0"/>
+              </a:rPr>
+              <a:t>You can easily identify who contributed what</a:t>
+            </a:r>
+          </a:p>
+          <a:p>
+            <a:pPr lvl="1">
+              <a:spcBef>
+                <a:spcPts val="800"/>
+              </a:spcBef>
+              <a:buFont typeface="Arial" charset="0"/>
+              <a:buChar char="•"/>
+              <a:defRPr/>
+            </a:pPr>
+            <a:endParaRPr lang="is-IS" sz="3200" dirty="0">
+              <a:latin typeface="Calibri" charset="0"/>
+            </a:endParaRPr>
+          </a:p>
+          <a:p>
+            <a:pPr lvl="1">
+              <a:spcBef>
+                <a:spcPts val="800"/>
+              </a:spcBef>
+              <a:buFont typeface="Arial" charset="0"/>
+              <a:buChar char="•"/>
+              <a:defRPr/>
+            </a:pPr>
+            <a:r>
+              <a:rPr lang="is-IS" sz="3200" dirty="0">
+                <a:latin typeface="Calibri" charset="0"/>
+              </a:rPr>
+              <a:t>Version control is about tracking versions of code and developing software with people</a:t>
+            </a:r>
+            <a:endParaRPr lang="en-US" sz="3200" dirty="0">
+              <a:latin typeface="Calibri" charset="0"/>
+            </a:endParaRPr>
+          </a:p>
+          <a:p>
+            <a:endParaRPr lang="en-US" dirty="0"/>
+          </a:p>
+        </p:txBody>
+      </p:sp>
     </p:spTree>
     <p:extLst>
       <p:ext uri="{BB962C8B-B14F-4D97-AF65-F5344CB8AC3E}">
-        <p14:creationId xmlns:p14="http://schemas.microsoft.com/office/powerpoint/2010/main" val="1249623642"/>
+        <p14:creationId xmlns:p14="http://schemas.microsoft.com/office/powerpoint/2010/main" val="1380445033"/>
       </p:ext>
     </p:extLst>
   </p:cSld>
@@ -8596,6 +8786,85 @@
           <a:bodyPr/>
           <a:lstStyle/>
           <a:p>
+            <a:r>
+              <a:rPr lang="en-US" dirty="0" smtClean="0"/>
+              <a:t>What is version control?</a:t>
+            </a:r>
+            <a:endParaRPr lang="en-US" dirty="0"/>
+          </a:p>
+        </p:txBody>
+      </p:sp>
+      <p:pic>
+        <p:nvPicPr>
+          <p:cNvPr id="4" name="Content Placeholder 3"/>
+          <p:cNvPicPr>
+            <a:picLocks noGrp="1" noChangeAspect="1"/>
+          </p:cNvPicPr>
+          <p:nvPr>
+            <p:ph idx="1"/>
+          </p:nvPr>
+        </p:nvPicPr>
+        <p:blipFill>
+          <a:blip r:embed="rId2"/>
+          <a:stretch>
+            <a:fillRect/>
+          </a:stretch>
+        </p:blipFill>
+        <p:spPr>
+          <a:xfrm>
+            <a:off x="895350" y="2820987"/>
+            <a:ext cx="7353300" cy="2616200"/>
+          </a:xfrm>
+          <a:prstGeom prst="rect">
+            <a:avLst/>
+          </a:prstGeom>
+        </p:spPr>
+      </p:pic>
+    </p:spTree>
+    <p:extLst>
+      <p:ext uri="{BB962C8B-B14F-4D97-AF65-F5344CB8AC3E}">
+        <p14:creationId xmlns:p14="http://schemas.microsoft.com/office/powerpoint/2010/main" val="1249623642"/>
+      </p:ext>
+    </p:extLst>
+  </p:cSld>
+  <p:clrMapOvr>
+    <a:masterClrMapping/>
+  </p:clrMapOvr>
+</p:sld>
+</file>
+
+<file path=ppt/slides/slide8.xml><?xml version="1.0" encoding="utf-8"?>
+<p:sld xmlns:a="http://schemas.openxmlformats.org/drawingml/2006/main" xmlns:r="http://schemas.openxmlformats.org/officeDocument/2006/relationships" xmlns:p="http://schemas.openxmlformats.org/presentationml/2006/main">
+  <p:cSld>
+    <p:spTree>
+      <p:nvGrpSpPr>
+        <p:cNvPr id="1" name=""/>
+        <p:cNvGrpSpPr/>
+        <p:nvPr/>
+      </p:nvGrpSpPr>
+      <p:grpSpPr>
+        <a:xfrm>
+          <a:off x="0" y="0"/>
+          <a:ext cx="0" cy="0"/>
+          <a:chOff x="0" y="0"/>
+          <a:chExt cx="0" cy="0"/>
+        </a:xfrm>
+      </p:grpSpPr>
+      <p:sp>
+        <p:nvSpPr>
+          <p:cNvPr id="2" name="Title 1"/>
+          <p:cNvSpPr>
+            <a:spLocks noGrp="1"/>
+          </p:cNvSpPr>
+          <p:nvPr>
+            <p:ph type="title"/>
+          </p:nvPr>
+        </p:nvSpPr>
+        <p:spPr/>
+        <p:txBody>
+          <a:bodyPr/>
+          <a:lstStyle/>
+          <a:p>
             <a:endParaRPr lang="en-US"/>
           </a:p>
         </p:txBody>
@@ -8656,7 +8925,7 @@
 </p:sld>
 </file>
 
-<file path=ppt/slides/slide8.xml><?xml version="1.0" encoding="utf-8"?>
+<file path=ppt/slides/slide9.xml><?xml version="1.0" encoding="utf-8"?>
 <p:sld xmlns:a="http://schemas.openxmlformats.org/drawingml/2006/main" xmlns:r="http://schemas.openxmlformats.org/officeDocument/2006/relationships" xmlns:p="http://schemas.openxmlformats.org/presentationml/2006/main">
   <p:cSld>
     <p:spTree>
@@ -8930,155 +9199,6 @@
       </p:par>
     </p:tnLst>
   </p:timing>
-</p:sld>
-</file>
-
-<file path=ppt/slides/slide9.xml><?xml version="1.0" encoding="utf-8"?>
-<p:sld xmlns:a="http://schemas.openxmlformats.org/drawingml/2006/main" xmlns:r="http://schemas.openxmlformats.org/officeDocument/2006/relationships" xmlns:p="http://schemas.openxmlformats.org/presentationml/2006/main">
-  <p:cSld>
-    <p:spTree>
-      <p:nvGrpSpPr>
-        <p:cNvPr id="1" name=""/>
-        <p:cNvGrpSpPr/>
-        <p:nvPr/>
-      </p:nvGrpSpPr>
-      <p:grpSpPr>
-        <a:xfrm>
-          <a:off x="0" y="0"/>
-          <a:ext cx="0" cy="0"/>
-          <a:chOff x="0" y="0"/>
-          <a:chExt cx="0" cy="0"/>
-        </a:xfrm>
-      </p:grpSpPr>
-      <p:sp>
-        <p:nvSpPr>
-          <p:cNvPr id="2" name="Title 1"/>
-          <p:cNvSpPr>
-            <a:spLocks noGrp="1"/>
-          </p:cNvSpPr>
-          <p:nvPr>
-            <p:ph type="title"/>
-          </p:nvPr>
-        </p:nvSpPr>
-        <p:spPr/>
-        <p:txBody>
-          <a:bodyPr/>
-          <a:lstStyle/>
-          <a:p>
-            <a:r>
-              <a:rPr lang="en-US" dirty="0" smtClean="0"/>
-              <a:t>Why do I need version control?</a:t>
-            </a:r>
-            <a:endParaRPr lang="en-US" dirty="0"/>
-          </a:p>
-        </p:txBody>
-      </p:sp>
-      <p:sp>
-        <p:nvSpPr>
-          <p:cNvPr id="3" name="Content Placeholder 2"/>
-          <p:cNvSpPr>
-            <a:spLocks noGrp="1"/>
-          </p:cNvSpPr>
-          <p:nvPr>
-            <p:ph idx="1"/>
-          </p:nvPr>
-        </p:nvSpPr>
-        <p:spPr/>
-        <p:txBody>
-          <a:bodyPr/>
-          <a:lstStyle/>
-          <a:p>
-            <a:pPr>
-              <a:spcBef>
-                <a:spcPts val="800"/>
-              </a:spcBef>
-              <a:buFont typeface="Arial" charset="0"/>
-              <a:buChar char="•"/>
-              <a:defRPr/>
-            </a:pPr>
-            <a:r>
-              <a:rPr lang="en-US" dirty="0">
-                <a:latin typeface="Calibri" charset="0"/>
-              </a:rPr>
-              <a:t>You are developing software with other people</a:t>
-            </a:r>
-          </a:p>
-          <a:p>
-            <a:pPr lvl="1">
-              <a:spcBef>
-                <a:spcPts val="800"/>
-              </a:spcBef>
-              <a:buFont typeface="Arial" charset="0"/>
-              <a:buChar char="•"/>
-              <a:defRPr/>
-            </a:pPr>
-            <a:r>
-              <a:rPr lang="en-US" sz="3200" dirty="0">
-                <a:latin typeface="Calibri" charset="0"/>
-              </a:rPr>
-              <a:t>You want to be able to identify and resolve conflicts during code development</a:t>
-            </a:r>
-          </a:p>
-          <a:p>
-            <a:pPr lvl="2">
-              <a:spcBef>
-                <a:spcPts val="800"/>
-              </a:spcBef>
-              <a:buFont typeface="Arial" charset="0"/>
-              <a:buChar char="•"/>
-              <a:defRPr/>
-            </a:pPr>
-            <a:r>
-              <a:rPr lang="en-US" sz="3200" dirty="0">
-                <a:latin typeface="Calibri" charset="0"/>
-              </a:rPr>
-              <a:t>Two people working on the same function at the same time</a:t>
-            </a:r>
-          </a:p>
-          <a:p>
-            <a:pPr lvl="1">
-              <a:spcBef>
-                <a:spcPts val="800"/>
-              </a:spcBef>
-              <a:buFont typeface="Arial" charset="0"/>
-              <a:buChar char="•"/>
-              <a:defRPr/>
-            </a:pPr>
-            <a:r>
-              <a:rPr lang="en-US" sz="3200" dirty="0">
-                <a:latin typeface="Calibri" charset="0"/>
-              </a:rPr>
-              <a:t>You need to be able to identify who is responsible for what pieces of code</a:t>
-            </a:r>
-          </a:p>
-          <a:p>
-            <a:pPr lvl="2">
-              <a:spcBef>
-                <a:spcPts val="800"/>
-              </a:spcBef>
-              <a:buFont typeface="Arial" charset="0"/>
-              <a:buChar char="•"/>
-              <a:defRPr/>
-            </a:pPr>
-            <a:endParaRPr lang="en-US" sz="3200" dirty="0">
-              <a:latin typeface="Calibri" charset="0"/>
-            </a:endParaRPr>
-          </a:p>
-          <a:p>
-            <a:endParaRPr lang="en-US" dirty="0"/>
-          </a:p>
-        </p:txBody>
-      </p:sp>
-    </p:spTree>
-    <p:extLst>
-      <p:ext uri="{BB962C8B-B14F-4D97-AF65-F5344CB8AC3E}">
-        <p14:creationId xmlns:p14="http://schemas.microsoft.com/office/powerpoint/2010/main" val="99088052"/>
-      </p:ext>
-    </p:extLst>
-  </p:cSld>
-  <p:clrMapOvr>
-    <a:masterClrMapping/>
-  </p:clrMapOvr>
 </p:sld>
 </file>
 

</xml_diff>